<commit_message>
added slides in pdf format
</commit_message>
<xml_diff>
--- a/presentation/chicago_tickets_project_slides.pptx
+++ b/presentation/chicago_tickets_project_slides.pptx
@@ -209,7 +209,7 @@
           <a:bodyPr lIns="0" rIns="0" tIns="0" bIns="0" anchor="b"/>
           <a:p>
             <a:pPr algn="r"/>
-            <a:fld id="{ED044D57-B85A-4601-9F62-A8F8008CA4F3}" type="slidenum">
+            <a:fld id="{A153BC75-DB1E-4473-849A-0BE2D088F81F}" type="slidenum">
               <a:rPr b="0" lang="en-US" sz="1400" spc="-1" strike="noStrike">
                 <a:latin typeface="Times New Roman"/>
               </a:rPr>
@@ -257,7 +257,7 @@
         <p:spPr>
           <a:xfrm>
             <a:off x="756000" y="5078520"/>
-            <a:ext cx="6046920" cy="4810320"/>
+            <a:ext cx="6046560" cy="4809960"/>
           </a:xfrm>
           <a:prstGeom prst="rect">
             <a:avLst/>
@@ -324,7 +324,7 @@
         <p:spPr>
           <a:xfrm>
             <a:off x="756000" y="5078520"/>
-            <a:ext cx="6046920" cy="4810320"/>
+            <a:ext cx="6046560" cy="4809960"/>
           </a:xfrm>
           <a:prstGeom prst="rect">
             <a:avLst/>
@@ -396,7 +396,7 @@
         <p:spPr>
           <a:xfrm>
             <a:off x="756000" y="5078520"/>
-            <a:ext cx="6046920" cy="5382720"/>
+            <a:ext cx="6046560" cy="5382360"/>
           </a:xfrm>
           <a:prstGeom prst="rect">
             <a:avLst/>
@@ -489,7 +489,7 @@
         <p:spPr>
           <a:xfrm>
             <a:off x="756000" y="5078520"/>
-            <a:ext cx="6046920" cy="4810320"/>
+            <a:ext cx="6046560" cy="4809960"/>
           </a:xfrm>
           <a:prstGeom prst="rect">
             <a:avLst/>
@@ -587,7 +587,7 @@
         <p:spPr>
           <a:xfrm>
             <a:off x="756000" y="5078520"/>
-            <a:ext cx="6046920" cy="4810320"/>
+            <a:ext cx="6046560" cy="4809960"/>
           </a:xfrm>
           <a:prstGeom prst="rect">
             <a:avLst/>
@@ -643,7 +643,7 @@
         <p:spPr>
           <a:xfrm>
             <a:off x="756000" y="5078520"/>
-            <a:ext cx="6046920" cy="4810320"/>
+            <a:ext cx="6046560" cy="4809960"/>
           </a:xfrm>
           <a:prstGeom prst="rect">
             <a:avLst/>
@@ -652,7 +652,7 @@
         <p:txBody>
           <a:bodyPr lIns="0" rIns="0" tIns="0" bIns="0"/>
           <a:p>
-            <a:pPr marL="216000" indent="-215640">
+            <a:pPr marL="216000" indent="-215280">
               <a:lnSpc>
                 <a:spcPct val="100000"/>
               </a:lnSpc>
@@ -710,7 +710,7 @@
         <p:spPr>
           <a:xfrm>
             <a:off x="756000" y="5078520"/>
-            <a:ext cx="6046920" cy="4810320"/>
+            <a:ext cx="6046560" cy="4809960"/>
           </a:xfrm>
           <a:prstGeom prst="rect">
             <a:avLst/>
@@ -766,7 +766,7 @@
         <p:spPr>
           <a:xfrm>
             <a:off x="756000" y="5078520"/>
-            <a:ext cx="6046920" cy="4810320"/>
+            <a:ext cx="6046560" cy="4809960"/>
           </a:xfrm>
           <a:prstGeom prst="rect">
             <a:avLst/>
@@ -866,7 +866,7 @@
         <p:spPr>
           <a:xfrm>
             <a:off x="756000" y="5078520"/>
-            <a:ext cx="6046920" cy="4810320"/>
+            <a:ext cx="6046560" cy="4809960"/>
           </a:xfrm>
           <a:prstGeom prst="rect">
             <a:avLst/>
@@ -926,7 +926,7 @@
         <p:spPr>
           <a:xfrm>
             <a:off x="756000" y="5078520"/>
-            <a:ext cx="6046920" cy="4810320"/>
+            <a:ext cx="6046560" cy="4809960"/>
           </a:xfrm>
           <a:prstGeom prst="rect">
             <a:avLst/>
@@ -1014,7 +1014,7 @@
         <p:spPr>
           <a:xfrm>
             <a:off x="756000" y="5078520"/>
-            <a:ext cx="6046920" cy="4810320"/>
+            <a:ext cx="6046560" cy="4809960"/>
           </a:xfrm>
           <a:prstGeom prst="rect">
             <a:avLst/>
@@ -1086,7 +1086,7 @@
         <p:spPr>
           <a:xfrm>
             <a:off x="756000" y="5078520"/>
-            <a:ext cx="6046920" cy="4816080"/>
+            <a:ext cx="6046560" cy="4815720"/>
           </a:xfrm>
           <a:prstGeom prst="rect">
             <a:avLst/>
@@ -1201,7 +1201,7 @@
         <p:spPr>
           <a:xfrm>
             <a:off x="756000" y="5078520"/>
-            <a:ext cx="6046920" cy="4810320"/>
+            <a:ext cx="6046560" cy="4809960"/>
           </a:xfrm>
           <a:prstGeom prst="rect">
             <a:avLst/>
@@ -1280,7 +1280,7 @@
         <p:spPr>
           <a:xfrm>
             <a:off x="756000" y="5078520"/>
-            <a:ext cx="6046920" cy="4810320"/>
+            <a:ext cx="6046560" cy="4809960"/>
           </a:xfrm>
           <a:prstGeom prst="rect">
             <a:avLst/>
@@ -1352,7 +1352,7 @@
         <p:spPr>
           <a:xfrm>
             <a:off x="756000" y="5078520"/>
-            <a:ext cx="6046920" cy="4810320"/>
+            <a:ext cx="6046560" cy="4809960"/>
           </a:xfrm>
           <a:prstGeom prst="rect">
             <a:avLst/>
@@ -1456,7 +1456,7 @@
         <p:spPr>
           <a:xfrm>
             <a:off x="756000" y="5078520"/>
-            <a:ext cx="6046920" cy="4810320"/>
+            <a:ext cx="6046560" cy="4809960"/>
           </a:xfrm>
           <a:prstGeom prst="rect">
             <a:avLst/>
@@ -1512,7 +1512,7 @@
         <p:spPr>
           <a:xfrm>
             <a:off x="756000" y="5078520"/>
-            <a:ext cx="6046920" cy="4810320"/>
+            <a:ext cx="6046560" cy="4809960"/>
           </a:xfrm>
           <a:prstGeom prst="rect">
             <a:avLst/>
@@ -4244,7 +4244,7 @@
         <p:spPr>
           <a:xfrm>
             <a:off x="0" y="4320000"/>
-            <a:ext cx="503280" cy="1079280"/>
+            <a:ext cx="502920" cy="1078920"/>
           </a:xfrm>
           <a:prstGeom prst="rect">
             <a:avLst/>
@@ -4275,8 +4275,8 @@
         </p:nvSpPr>
         <p:spPr>
           <a:xfrm>
-            <a:off x="720000" y="300960"/>
-            <a:ext cx="8854920" cy="1261800"/>
+            <a:off x="504000" y="301320"/>
+            <a:ext cx="9072000" cy="1261800"/>
           </a:xfrm>
           <a:prstGeom prst="rect">
             <a:avLst/>
@@ -4285,13 +4285,14 @@
         <p:txBody>
           <a:bodyPr lIns="0" rIns="0" tIns="0" bIns="0" anchor="ctr"/>
           <a:p>
-            <a:r>
-              <a:rPr b="0" lang="en-US" sz="1800" spc="-1" strike="noStrike">
+            <a:pPr algn="ctr"/>
+            <a:r>
+              <a:rPr b="0" lang="en-US" sz="4400" spc="-1" strike="noStrike">
                 <a:latin typeface="Arial"/>
               </a:rPr>
               <a:t>Click to edit the title text format</a:t>
             </a:r>
-            <a:endParaRPr b="0" lang="en-US" sz="1800" spc="-1" strike="noStrike">
+            <a:endParaRPr b="0" lang="en-US" sz="4400" spc="-1" strike="noStrike">
               <a:latin typeface="Arial"/>
             </a:endParaRPr>
           </a:p>
@@ -4309,8 +4310,8 @@
         </p:nvSpPr>
         <p:spPr>
           <a:xfrm>
-            <a:off x="720000" y="2160000"/>
-            <a:ext cx="8639280" cy="4384080"/>
+            <a:off x="504000" y="1768680"/>
+            <a:ext cx="9072000" cy="4384080"/>
           </a:xfrm>
           <a:prstGeom prst="rect">
             <a:avLst/>
@@ -4333,12 +4334,12 @@
               <a:buChar char=""/>
             </a:pPr>
             <a:r>
-              <a:rPr b="0" lang="en-US" sz="1800" spc="-1" strike="noStrike">
+              <a:rPr b="0" lang="en-US" sz="3200" spc="-1" strike="noStrike">
                 <a:latin typeface="Arial"/>
               </a:rPr>
               <a:t>Click to edit the outline text format</a:t>
             </a:r>
-            <a:endParaRPr b="0" lang="en-US" sz="1800" spc="-1" strike="noStrike">
+            <a:endParaRPr b="0" lang="en-US" sz="3200" spc="-1" strike="noStrike">
               <a:latin typeface="Arial"/>
             </a:endParaRPr>
           </a:p>
@@ -4355,12 +4356,12 @@
               <a:buChar char=""/>
             </a:pPr>
             <a:r>
-              <a:rPr b="0" lang="en-US" sz="1800" spc="-1" strike="noStrike">
+              <a:rPr b="0" lang="en-US" sz="2800" spc="-1" strike="noStrike">
                 <a:latin typeface="Arial"/>
               </a:rPr>
               <a:t>Second Outline Level</a:t>
             </a:r>
-            <a:endParaRPr b="0" lang="en-US" sz="1800" spc="-1" strike="noStrike">
+            <a:endParaRPr b="0" lang="en-US" sz="2800" spc="-1" strike="noStrike">
               <a:latin typeface="Arial"/>
             </a:endParaRPr>
           </a:p>
@@ -4377,12 +4378,12 @@
               <a:buChar char=""/>
             </a:pPr>
             <a:r>
-              <a:rPr b="0" lang="en-US" sz="1800" spc="-1" strike="noStrike">
+              <a:rPr b="0" lang="en-US" sz="2400" spc="-1" strike="noStrike">
                 <a:latin typeface="Arial"/>
               </a:rPr>
               <a:t>Third Outline Level</a:t>
             </a:r>
-            <a:endParaRPr b="0" lang="en-US" sz="1800" spc="-1" strike="noStrike">
+            <a:endParaRPr b="0" lang="en-US" sz="2400" spc="-1" strike="noStrike">
               <a:latin typeface="Arial"/>
             </a:endParaRPr>
           </a:p>
@@ -4399,12 +4400,12 @@
               <a:buChar char=""/>
             </a:pPr>
             <a:r>
-              <a:rPr b="0" lang="en-US" sz="1800" spc="-1" strike="noStrike">
+              <a:rPr b="0" lang="en-US" sz="2000" spc="-1" strike="noStrike">
                 <a:latin typeface="Arial"/>
               </a:rPr>
               <a:t>Fourth Outline Level</a:t>
             </a:r>
-            <a:endParaRPr b="0" lang="en-US" sz="1800" spc="-1" strike="noStrike">
+            <a:endParaRPr b="0" lang="en-US" sz="2000" spc="-1" strike="noStrike">
               <a:latin typeface="Arial"/>
             </a:endParaRPr>
           </a:p>
@@ -4421,12 +4422,12 @@
               <a:buChar char=""/>
             </a:pPr>
             <a:r>
-              <a:rPr b="0" lang="en-US" sz="1800" spc="-1" strike="noStrike">
+              <a:rPr b="0" lang="en-US" sz="2000" spc="-1" strike="noStrike">
                 <a:latin typeface="Arial"/>
               </a:rPr>
               <a:t>Fifth Outline Level</a:t>
             </a:r>
-            <a:endParaRPr b="0" lang="en-US" sz="1800" spc="-1" strike="noStrike">
+            <a:endParaRPr b="0" lang="en-US" sz="2000" spc="-1" strike="noStrike">
               <a:latin typeface="Arial"/>
             </a:endParaRPr>
           </a:p>
@@ -4443,12 +4444,12 @@
               <a:buChar char=""/>
             </a:pPr>
             <a:r>
-              <a:rPr b="0" lang="en-US" sz="1800" spc="-1" strike="noStrike">
+              <a:rPr b="0" lang="en-US" sz="2000" spc="-1" strike="noStrike">
                 <a:latin typeface="Arial"/>
               </a:rPr>
               <a:t>Sixth Outline Level</a:t>
             </a:r>
-            <a:endParaRPr b="0" lang="en-US" sz="1800" spc="-1" strike="noStrike">
+            <a:endParaRPr b="0" lang="en-US" sz="2000" spc="-1" strike="noStrike">
               <a:latin typeface="Arial"/>
             </a:endParaRPr>
           </a:p>
@@ -4465,12 +4466,12 @@
               <a:buChar char=""/>
             </a:pPr>
             <a:r>
-              <a:rPr b="0" lang="en-US" sz="1800" spc="-1" strike="noStrike">
+              <a:rPr b="0" lang="en-US" sz="2000" spc="-1" strike="noStrike">
                 <a:latin typeface="Arial"/>
               </a:rPr>
               <a:t>Seventh Outline Level</a:t>
             </a:r>
-            <a:endParaRPr b="0" lang="en-US" sz="1800" spc="-1" strike="noStrike">
+            <a:endParaRPr b="0" lang="en-US" sz="2000" spc="-1" strike="noStrike">
               <a:latin typeface="Arial"/>
             </a:endParaRPr>
           </a:p>
@@ -4522,7 +4523,7 @@
         <p:spPr>
           <a:xfrm>
             <a:off x="0" y="288000"/>
-            <a:ext cx="503280" cy="1079280"/>
+            <a:ext cx="502920" cy="1078920"/>
           </a:xfrm>
           <a:prstGeom prst="rect">
             <a:avLst/>
@@ -4801,7 +4802,7 @@
         <p:spPr>
           <a:xfrm>
             <a:off x="792000" y="4104000"/>
-            <a:ext cx="8567280" cy="1439280"/>
+            <a:ext cx="8566920" cy="1438920"/>
           </a:xfrm>
           <a:prstGeom prst="rect">
             <a:avLst/>
@@ -4863,7 +4864,7 @@
         <p:spPr>
           <a:xfrm>
             <a:off x="792000" y="5904000"/>
-            <a:ext cx="8567280" cy="981720"/>
+            <a:ext cx="8566920" cy="981360"/>
           </a:xfrm>
           <a:prstGeom prst="rect">
             <a:avLst/>
@@ -4916,7 +4917,7 @@
         <p:spPr>
           <a:xfrm>
             <a:off x="3106800" y="247680"/>
-            <a:ext cx="3866040" cy="4028040"/>
+            <a:ext cx="3865680" cy="4027680"/>
           </a:xfrm>
           <a:prstGeom prst="rect">
             <a:avLst/>
@@ -4987,7 +4988,7 @@
         <p:spPr>
           <a:xfrm>
             <a:off x="720000" y="300960"/>
-            <a:ext cx="8854920" cy="1261800"/>
+            <a:ext cx="8854560" cy="1261440"/>
           </a:xfrm>
           <a:prstGeom prst="rect">
             <a:avLst/>
@@ -5031,7 +5032,7 @@
         <p:spPr>
           <a:xfrm>
             <a:off x="720000" y="2160000"/>
-            <a:ext cx="8639280" cy="4384080"/>
+            <a:ext cx="8638920" cy="4383720"/>
           </a:xfrm>
           <a:prstGeom prst="rect">
             <a:avLst/>
@@ -5050,7 +5051,7 @@
         <p:txBody>
           <a:bodyPr lIns="0" rIns="0" tIns="0" bIns="0"/>
           <a:p>
-            <a:pPr marL="432000" indent="-323280">
+            <a:pPr marL="432000" indent="-322920">
               <a:lnSpc>
                 <a:spcPct val="100000"/>
               </a:lnSpc>
@@ -5093,7 +5094,7 @@
         <p:spPr>
           <a:xfrm>
             <a:off x="1701720" y="3108960"/>
-            <a:ext cx="6676200" cy="4450320"/>
+            <a:ext cx="6675840" cy="4449960"/>
           </a:xfrm>
           <a:prstGeom prst="rect">
             <a:avLst/>
@@ -5164,7 +5165,7 @@
         <p:spPr>
           <a:xfrm>
             <a:off x="720000" y="300960"/>
-            <a:ext cx="8854920" cy="1261800"/>
+            <a:ext cx="8854560" cy="1261440"/>
           </a:xfrm>
           <a:prstGeom prst="rect">
             <a:avLst/>
@@ -5208,7 +5209,7 @@
         <p:spPr>
           <a:xfrm>
             <a:off x="720000" y="2160000"/>
-            <a:ext cx="8639280" cy="4384080"/>
+            <a:ext cx="8638920" cy="4383720"/>
           </a:xfrm>
           <a:prstGeom prst="rect">
             <a:avLst/>
@@ -5227,7 +5228,7 @@
         <p:txBody>
           <a:bodyPr lIns="0" rIns="0" tIns="0" bIns="0"/>
           <a:p>
-            <a:pPr marL="432000" indent="-323280">
+            <a:pPr marL="432000" indent="-322920">
               <a:lnSpc>
                 <a:spcPct val="100000"/>
               </a:lnSpc>
@@ -5270,7 +5271,7 @@
         <p:spPr>
           <a:xfrm>
             <a:off x="3022560" y="2591640"/>
-            <a:ext cx="4034160" cy="3908520"/>
+            <a:ext cx="4033800" cy="3908160"/>
           </a:xfrm>
           <a:prstGeom prst="rect">
             <a:avLst/>
@@ -5341,7 +5342,7 @@
         <p:spPr>
           <a:xfrm>
             <a:off x="720000" y="300960"/>
-            <a:ext cx="8854920" cy="1261800"/>
+            <a:ext cx="8854560" cy="1261440"/>
           </a:xfrm>
           <a:prstGeom prst="rect">
             <a:avLst/>
@@ -5385,7 +5386,7 @@
         <p:spPr>
           <a:xfrm>
             <a:off x="720000" y="2160000"/>
-            <a:ext cx="8639280" cy="4384080"/>
+            <a:ext cx="8638920" cy="4383720"/>
           </a:xfrm>
           <a:prstGeom prst="rect">
             <a:avLst/>
@@ -5404,7 +5405,7 @@
         <p:txBody>
           <a:bodyPr lIns="0" rIns="0" tIns="0" bIns="0"/>
           <a:p>
-            <a:pPr marL="432000" indent="-323280">
+            <a:pPr marL="432000" indent="-322920">
               <a:lnSpc>
                 <a:spcPct val="100000"/>
               </a:lnSpc>
@@ -5433,7 +5434,7 @@
             </a:endParaRPr>
           </a:p>
           <a:p>
-            <a:pPr lvl="1" marL="864000" indent="-323280">
+            <a:pPr lvl="1" marL="864000" indent="-322920">
               <a:lnSpc>
                 <a:spcPct val="100000"/>
               </a:lnSpc>
@@ -5482,7 +5483,7 @@
             </a:endParaRPr>
           </a:p>
           <a:p>
-            <a:pPr lvl="1" marL="864000" indent="-323280">
+            <a:pPr lvl="1" marL="864000" indent="-322920">
               <a:lnSpc>
                 <a:spcPct val="100000"/>
               </a:lnSpc>
@@ -5531,7 +5532,7 @@
             </a:endParaRPr>
           </a:p>
           <a:p>
-            <a:pPr lvl="1" marL="864000" indent="-323280">
+            <a:pPr lvl="1" marL="864000" indent="-322920">
               <a:lnSpc>
                 <a:spcPct val="100000"/>
               </a:lnSpc>
@@ -5580,7 +5581,7 @@
             </a:endParaRPr>
           </a:p>
           <a:p>
-            <a:pPr marL="432000" indent="-323280">
+            <a:pPr marL="432000" indent="-322920">
               <a:lnSpc>
                 <a:spcPct val="100000"/>
               </a:lnSpc>
@@ -5671,7 +5672,7 @@
         <p:spPr>
           <a:xfrm>
             <a:off x="720000" y="300960"/>
-            <a:ext cx="8854920" cy="1261800"/>
+            <a:ext cx="8854560" cy="1261440"/>
           </a:xfrm>
           <a:prstGeom prst="rect">
             <a:avLst/>
@@ -5715,7 +5716,7 @@
         <p:spPr>
           <a:xfrm>
             <a:off x="720000" y="2160000"/>
-            <a:ext cx="8639280" cy="4384080"/>
+            <a:ext cx="8638920" cy="4383720"/>
           </a:xfrm>
           <a:prstGeom prst="rect">
             <a:avLst/>
@@ -5734,7 +5735,7 @@
         <p:txBody>
           <a:bodyPr lIns="0" rIns="0" tIns="0" bIns="0"/>
           <a:p>
-            <a:pPr marL="432000" indent="-323280">
+            <a:pPr marL="432000" indent="-322920">
               <a:lnSpc>
                 <a:spcPct val="100000"/>
               </a:lnSpc>
@@ -5763,7 +5764,7 @@
             </a:endParaRPr>
           </a:p>
           <a:p>
-            <a:pPr lvl="1" marL="864000" indent="-323280">
+            <a:pPr lvl="1" marL="864000" indent="-322920">
               <a:lnSpc>
                 <a:spcPct val="100000"/>
               </a:lnSpc>
@@ -5812,7 +5813,7 @@
             </a:endParaRPr>
           </a:p>
           <a:p>
-            <a:pPr lvl="1" marL="864000" indent="-323280">
+            <a:pPr lvl="1" marL="864000" indent="-322920">
               <a:lnSpc>
                 <a:spcPct val="100000"/>
               </a:lnSpc>
@@ -5861,7 +5862,7 @@
             </a:endParaRPr>
           </a:p>
           <a:p>
-            <a:pPr lvl="1" marL="864000" indent="-323280">
+            <a:pPr lvl="1" marL="864000" indent="-322920">
               <a:lnSpc>
                 <a:spcPct val="100000"/>
               </a:lnSpc>
@@ -5930,7 +5931,7 @@
             </a:endParaRPr>
           </a:p>
           <a:p>
-            <a:pPr marL="432000" indent="-323280">
+            <a:pPr marL="432000" indent="-322920">
               <a:lnSpc>
                 <a:spcPct val="100000"/>
               </a:lnSpc>
@@ -5959,7 +5960,7 @@
             </a:endParaRPr>
           </a:p>
           <a:p>
-            <a:pPr lvl="1" marL="864000" indent="-323280">
+            <a:pPr lvl="1" marL="864000" indent="-322920">
               <a:lnSpc>
                 <a:spcPct val="100000"/>
               </a:lnSpc>
@@ -5981,14 +5982,14 @@
                 <a:latin typeface="Open Sans"/>
                 <a:ea typeface="DejaVu Sans"/>
               </a:rPr>
-              <a:t>02/02/00 (0.782), 02/02/01 (0.630)</a:t>
+              <a:t>02/02/99 (0.782), 02/02/01 (0.630)</a:t>
             </a:r>
             <a:endParaRPr b="0" lang="en-US" sz="2200" spc="-1" strike="noStrike">
               <a:latin typeface="Arial"/>
             </a:endParaRPr>
           </a:p>
           <a:p>
-            <a:pPr lvl="1" marL="864000" indent="-323280">
+            <a:pPr lvl="1" marL="864000" indent="-322920">
               <a:lnSpc>
                 <a:spcPct val="100000"/>
               </a:lnSpc>
@@ -6017,7 +6018,7 @@
             </a:endParaRPr>
           </a:p>
           <a:p>
-            <a:pPr lvl="1" marL="864000" indent="-323280">
+            <a:pPr lvl="1" marL="864000" indent="-322920">
               <a:lnSpc>
                 <a:spcPct val="100000"/>
               </a:lnSpc>
@@ -6108,7 +6109,7 @@
         <p:spPr>
           <a:xfrm>
             <a:off x="720000" y="300960"/>
-            <a:ext cx="8854920" cy="1261800"/>
+            <a:ext cx="8854560" cy="1261440"/>
           </a:xfrm>
           <a:prstGeom prst="rect">
             <a:avLst/>
@@ -6152,7 +6153,7 @@
         <p:spPr>
           <a:xfrm>
             <a:off x="720000" y="2160000"/>
-            <a:ext cx="8639280" cy="4384080"/>
+            <a:ext cx="8638920" cy="4383720"/>
           </a:xfrm>
           <a:prstGeom prst="rect">
             <a:avLst/>
@@ -6171,7 +6172,7 @@
         <p:txBody>
           <a:bodyPr lIns="0" rIns="0" tIns="0" bIns="0"/>
           <a:p>
-            <a:pPr marL="432000" indent="-323280">
+            <a:pPr marL="432000" indent="-322920">
               <a:lnSpc>
                 <a:spcPct val="100000"/>
               </a:lnSpc>
@@ -6200,7 +6201,7 @@
             </a:endParaRPr>
           </a:p>
           <a:p>
-            <a:pPr marL="432000" indent="-323280">
+            <a:pPr marL="432000" indent="-322920">
               <a:lnSpc>
                 <a:spcPct val="100000"/>
               </a:lnSpc>
@@ -6291,7 +6292,7 @@
         <p:spPr>
           <a:xfrm>
             <a:off x="720000" y="300960"/>
-            <a:ext cx="8854920" cy="1261800"/>
+            <a:ext cx="8854560" cy="1261440"/>
           </a:xfrm>
           <a:prstGeom prst="rect">
             <a:avLst/>
@@ -6339,7 +6340,7 @@
         <p:spPr>
           <a:xfrm>
             <a:off x="495720" y="1463040"/>
-            <a:ext cx="9087480" cy="5111640"/>
+            <a:ext cx="9087120" cy="5111280"/>
           </a:xfrm>
           <a:prstGeom prst="rect">
             <a:avLst/>
@@ -6410,7 +6411,7 @@
         <p:spPr>
           <a:xfrm>
             <a:off x="720000" y="300960"/>
-            <a:ext cx="8854920" cy="1261800"/>
+            <a:ext cx="8854560" cy="1261440"/>
           </a:xfrm>
           <a:prstGeom prst="rect">
             <a:avLst/>
@@ -6454,7 +6455,7 @@
         <p:spPr>
           <a:xfrm>
             <a:off x="720000" y="2160000"/>
-            <a:ext cx="8639280" cy="4384080"/>
+            <a:ext cx="8638920" cy="4383720"/>
           </a:xfrm>
           <a:prstGeom prst="rect">
             <a:avLst/>
@@ -6473,7 +6474,7 @@
         <p:txBody>
           <a:bodyPr lIns="0" rIns="0" tIns="0" bIns="0"/>
           <a:p>
-            <a:pPr marL="432000" indent="-323280">
+            <a:pPr marL="432000" indent="-322920">
               <a:lnSpc>
                 <a:spcPct val="100000"/>
               </a:lnSpc>
@@ -6502,7 +6503,7 @@
             </a:endParaRPr>
           </a:p>
           <a:p>
-            <a:pPr marL="432000" indent="-323280">
+            <a:pPr marL="432000" indent="-322920">
               <a:lnSpc>
                 <a:spcPct val="100000"/>
               </a:lnSpc>
@@ -6531,7 +6532,7 @@
             </a:endParaRPr>
           </a:p>
           <a:p>
-            <a:pPr marL="432000" indent="-323280">
+            <a:pPr marL="432000" indent="-322920">
               <a:lnSpc>
                 <a:spcPct val="100000"/>
               </a:lnSpc>
@@ -6560,7 +6561,7 @@
             </a:endParaRPr>
           </a:p>
           <a:p>
-            <a:pPr marL="432000" indent="-323280">
+            <a:pPr marL="432000" indent="-322920">
               <a:lnSpc>
                 <a:spcPct val="100000"/>
               </a:lnSpc>
@@ -6589,7 +6590,7 @@
             </a:endParaRPr>
           </a:p>
           <a:p>
-            <a:pPr marL="432000" indent="-323280">
+            <a:pPr marL="432000" indent="-322920">
               <a:lnSpc>
                 <a:spcPct val="100000"/>
               </a:lnSpc>
@@ -6680,7 +6681,7 @@
         <p:spPr>
           <a:xfrm>
             <a:off x="720000" y="300960"/>
-            <a:ext cx="8854920" cy="1261800"/>
+            <a:ext cx="8854560" cy="1261440"/>
           </a:xfrm>
           <a:prstGeom prst="rect">
             <a:avLst/>
@@ -6724,7 +6725,7 @@
         <p:spPr>
           <a:xfrm>
             <a:off x="720000" y="2160000"/>
-            <a:ext cx="8639280" cy="4384080"/>
+            <a:ext cx="8638920" cy="4383720"/>
           </a:xfrm>
           <a:prstGeom prst="rect">
             <a:avLst/>
@@ -6743,7 +6744,7 @@
         <p:txBody>
           <a:bodyPr lIns="0" rIns="0" tIns="0" bIns="0"/>
           <a:p>
-            <a:pPr marL="432000" indent="-323280">
+            <a:pPr marL="432000" indent="-322920">
               <a:lnSpc>
                 <a:spcPct val="100000"/>
               </a:lnSpc>
@@ -6784,7 +6785,7 @@
             </a:endParaRPr>
           </a:p>
           <a:p>
-            <a:pPr marL="432000" indent="-323280">
+            <a:pPr marL="432000" indent="-322920">
               <a:lnSpc>
                 <a:spcPct val="100000"/>
               </a:lnSpc>
@@ -6875,7 +6876,7 @@
         <p:spPr>
           <a:xfrm>
             <a:off x="720000" y="300960"/>
-            <a:ext cx="8854920" cy="1261800"/>
+            <a:ext cx="8854560" cy="1261440"/>
           </a:xfrm>
           <a:prstGeom prst="rect">
             <a:avLst/>
@@ -6919,7 +6920,7 @@
         <p:spPr>
           <a:xfrm>
             <a:off x="720000" y="2160000"/>
-            <a:ext cx="8639280" cy="4384080"/>
+            <a:ext cx="8638920" cy="4383720"/>
           </a:xfrm>
           <a:prstGeom prst="rect">
             <a:avLst/>
@@ -6938,7 +6939,7 @@
         <p:txBody>
           <a:bodyPr lIns="0" rIns="0" tIns="0" bIns="0"/>
           <a:p>
-            <a:pPr marL="432000" indent="-323280">
+            <a:pPr marL="432000" indent="-322920">
               <a:lnSpc>
                 <a:spcPct val="100000"/>
               </a:lnSpc>
@@ -6977,7 +6978,7 @@
             </a:endParaRPr>
           </a:p>
           <a:p>
-            <a:pPr marL="432000" indent="-323280">
+            <a:pPr marL="432000" indent="-322920">
               <a:lnSpc>
                 <a:spcPct val="100000"/>
               </a:lnSpc>
@@ -7016,7 +7017,7 @@
             </a:endParaRPr>
           </a:p>
           <a:p>
-            <a:pPr marL="432000" indent="-323280">
+            <a:pPr marL="432000" indent="-322920">
               <a:lnSpc>
                 <a:spcPct val="100000"/>
               </a:lnSpc>
@@ -7107,7 +7108,7 @@
         <p:spPr>
           <a:xfrm>
             <a:off x="720000" y="300960"/>
-            <a:ext cx="8854920" cy="1261800"/>
+            <a:ext cx="8854560" cy="1261440"/>
           </a:xfrm>
           <a:prstGeom prst="rect">
             <a:avLst/>
@@ -7151,7 +7152,7 @@
         <p:spPr>
           <a:xfrm>
             <a:off x="720000" y="2160000"/>
-            <a:ext cx="8639280" cy="4384080"/>
+            <a:ext cx="8638920" cy="4383720"/>
           </a:xfrm>
           <a:prstGeom prst="rect">
             <a:avLst/>
@@ -7210,7 +7211,7 @@
         <p:spPr>
           <a:xfrm>
             <a:off x="1719720" y="1563480"/>
-            <a:ext cx="6658920" cy="4980600"/>
+            <a:ext cx="6658560" cy="4980240"/>
           </a:xfrm>
           <a:prstGeom prst="rect">
             <a:avLst/>
@@ -7281,7 +7282,7 @@
         <p:spPr>
           <a:xfrm>
             <a:off x="720000" y="300960"/>
-            <a:ext cx="8854920" cy="1261800"/>
+            <a:ext cx="8854560" cy="1261440"/>
           </a:xfrm>
           <a:prstGeom prst="rect">
             <a:avLst/>
@@ -7325,7 +7326,7 @@
         <p:spPr>
           <a:xfrm>
             <a:off x="720000" y="2160000"/>
-            <a:ext cx="8639280" cy="4384080"/>
+            <a:ext cx="8638920" cy="4383720"/>
           </a:xfrm>
           <a:prstGeom prst="rect">
             <a:avLst/>
@@ -7344,7 +7345,7 @@
         <p:txBody>
           <a:bodyPr lIns="0" rIns="0" tIns="0" bIns="0"/>
           <a:p>
-            <a:pPr marL="432000" indent="-323280">
+            <a:pPr marL="432000" indent="-322920">
               <a:lnSpc>
                 <a:spcPct val="100000"/>
               </a:lnSpc>
@@ -7373,7 +7374,7 @@
             </a:endParaRPr>
           </a:p>
           <a:p>
-            <a:pPr marL="432000" indent="-323280">
+            <a:pPr marL="432000" indent="-322920">
               <a:lnSpc>
                 <a:spcPct val="100000"/>
               </a:lnSpc>
@@ -7402,7 +7403,7 @@
             </a:endParaRPr>
           </a:p>
           <a:p>
-            <a:pPr marL="432000" indent="-323280">
+            <a:pPr marL="432000" indent="-322920">
               <a:lnSpc>
                 <a:spcPct val="100000"/>
               </a:lnSpc>
@@ -7431,7 +7432,7 @@
             </a:endParaRPr>
           </a:p>
           <a:p>
-            <a:pPr marL="432000" indent="-323280">
+            <a:pPr marL="432000" indent="-322920">
               <a:lnSpc>
                 <a:spcPct val="100000"/>
               </a:lnSpc>
@@ -7460,7 +7461,7 @@
             </a:endParaRPr>
           </a:p>
           <a:p>
-            <a:pPr marL="432000" indent="-323280">
+            <a:pPr marL="432000" indent="-322920">
               <a:lnSpc>
                 <a:spcPct val="100000"/>
               </a:lnSpc>
@@ -7499,7 +7500,7 @@
             </a:endParaRPr>
           </a:p>
           <a:p>
-            <a:pPr marL="432000" indent="-323280">
+            <a:pPr marL="432000" indent="-322920">
               <a:lnSpc>
                 <a:spcPct val="100000"/>
               </a:lnSpc>
@@ -7528,7 +7529,7 @@
             </a:endParaRPr>
           </a:p>
           <a:p>
-            <a:pPr marL="432000" indent="-323280">
+            <a:pPr marL="432000" indent="-322920">
               <a:lnSpc>
                 <a:spcPct val="100000"/>
               </a:lnSpc>
@@ -7617,7 +7618,7 @@
             </a:endParaRPr>
           </a:p>
           <a:p>
-            <a:pPr marL="432000" indent="-323280">
+            <a:pPr marL="432000" indent="-322920">
               <a:lnSpc>
                 <a:spcPct val="100000"/>
               </a:lnSpc>
@@ -7706,7 +7707,7 @@
             </a:endParaRPr>
           </a:p>
           <a:p>
-            <a:pPr marL="432000" indent="-323280">
+            <a:pPr marL="432000" indent="-322920">
               <a:lnSpc>
                 <a:spcPct val="100000"/>
               </a:lnSpc>
@@ -7797,7 +7798,7 @@
         <p:spPr>
           <a:xfrm>
             <a:off x="720000" y="300960"/>
-            <a:ext cx="8854920" cy="1261800"/>
+            <a:ext cx="8854560" cy="1261440"/>
           </a:xfrm>
           <a:prstGeom prst="rect">
             <a:avLst/>
@@ -7841,7 +7842,7 @@
         <p:spPr>
           <a:xfrm>
             <a:off x="720000" y="2160000"/>
-            <a:ext cx="8639280" cy="4384080"/>
+            <a:ext cx="8638920" cy="4383720"/>
           </a:xfrm>
           <a:prstGeom prst="rect">
             <a:avLst/>
@@ -7860,7 +7861,7 @@
         <p:txBody>
           <a:bodyPr lIns="0" rIns="0" tIns="0" bIns="0"/>
           <a:p>
-            <a:pPr marL="432000" indent="-323280">
+            <a:pPr marL="432000" indent="-322920">
               <a:lnSpc>
                 <a:spcPct val="100000"/>
               </a:lnSpc>
@@ -7889,7 +7890,7 @@
             </a:endParaRPr>
           </a:p>
           <a:p>
-            <a:pPr marL="432000" indent="-323280">
+            <a:pPr marL="432000" indent="-322920">
               <a:lnSpc>
                 <a:spcPct val="100000"/>
               </a:lnSpc>
@@ -7918,7 +7919,7 @@
             </a:endParaRPr>
           </a:p>
           <a:p>
-            <a:pPr marL="432000" indent="-323280">
+            <a:pPr marL="432000" indent="-322920">
               <a:lnSpc>
                 <a:spcPct val="100000"/>
               </a:lnSpc>
@@ -7967,7 +7968,7 @@
             </a:endParaRPr>
           </a:p>
           <a:p>
-            <a:pPr marL="432000" indent="-323280">
+            <a:pPr marL="432000" indent="-322920">
               <a:lnSpc>
                 <a:spcPct val="100000"/>
               </a:lnSpc>
@@ -8006,7 +8007,7 @@
             </a:endParaRPr>
           </a:p>
           <a:p>
-            <a:pPr marL="432000" indent="-323280">
+            <a:pPr marL="432000" indent="-322920">
               <a:lnSpc>
                 <a:spcPct val="100000"/>
               </a:lnSpc>
@@ -8097,7 +8098,7 @@
         <p:spPr>
           <a:xfrm>
             <a:off x="720000" y="300960"/>
-            <a:ext cx="8854920" cy="1261800"/>
+            <a:ext cx="8854560" cy="1261440"/>
           </a:xfrm>
           <a:prstGeom prst="rect">
             <a:avLst/>
@@ -8141,7 +8142,7 @@
         <p:spPr>
           <a:xfrm>
             <a:off x="720000" y="2160000"/>
-            <a:ext cx="8639280" cy="4384080"/>
+            <a:ext cx="8638920" cy="4383720"/>
           </a:xfrm>
           <a:prstGeom prst="rect">
             <a:avLst/>
@@ -8171,7 +8172,7 @@
         <p:spPr>
           <a:xfrm>
             <a:off x="1114560" y="1311120"/>
-            <a:ext cx="7850520" cy="5232960"/>
+            <a:ext cx="7850160" cy="5232600"/>
           </a:xfrm>
           <a:prstGeom prst="rect">
             <a:avLst/>
@@ -8242,7 +8243,7 @@
         <p:spPr>
           <a:xfrm>
             <a:off x="720000" y="300960"/>
-            <a:ext cx="8854920" cy="1261800"/>
+            <a:ext cx="8854560" cy="1261440"/>
           </a:xfrm>
           <a:prstGeom prst="rect">
             <a:avLst/>
@@ -8286,7 +8287,7 @@
         <p:spPr>
           <a:xfrm>
             <a:off x="720000" y="2160000"/>
-            <a:ext cx="8639280" cy="4384080"/>
+            <a:ext cx="8638920" cy="4383720"/>
           </a:xfrm>
           <a:prstGeom prst="rect">
             <a:avLst/>
@@ -8316,7 +8317,7 @@
         <p:spPr>
           <a:xfrm>
             <a:off x="1091520" y="1280160"/>
-            <a:ext cx="7896600" cy="5263920"/>
+            <a:ext cx="7896240" cy="5263560"/>
           </a:xfrm>
           <a:prstGeom prst="rect">
             <a:avLst/>
@@ -8387,7 +8388,7 @@
         <p:spPr>
           <a:xfrm>
             <a:off x="720000" y="300960"/>
-            <a:ext cx="8854920" cy="1261800"/>
+            <a:ext cx="8854560" cy="1261440"/>
           </a:xfrm>
           <a:prstGeom prst="rect">
             <a:avLst/>
@@ -8431,7 +8432,7 @@
         <p:spPr>
           <a:xfrm>
             <a:off x="720000" y="2160000"/>
-            <a:ext cx="8639280" cy="4384080"/>
+            <a:ext cx="8638920" cy="4383720"/>
           </a:xfrm>
           <a:prstGeom prst="rect">
             <a:avLst/>
@@ -8461,7 +8462,7 @@
         <p:spPr>
           <a:xfrm>
             <a:off x="720000" y="3013920"/>
-            <a:ext cx="7023600" cy="3530160"/>
+            <a:ext cx="7023240" cy="3529800"/>
           </a:xfrm>
           <a:prstGeom prst="rect">
             <a:avLst/>
@@ -8484,7 +8485,7 @@
         <p:spPr>
           <a:xfrm>
             <a:off x="678600" y="2160000"/>
-            <a:ext cx="8722440" cy="4384080"/>
+            <a:ext cx="8722080" cy="4383720"/>
           </a:xfrm>
           <a:prstGeom prst="rect">
             <a:avLst/>
@@ -8555,7 +8556,7 @@
         <p:spPr>
           <a:xfrm>
             <a:off x="720000" y="300960"/>
-            <a:ext cx="8854920" cy="1261800"/>
+            <a:ext cx="8854560" cy="1261440"/>
           </a:xfrm>
           <a:prstGeom prst="rect">
             <a:avLst/>
@@ -8599,7 +8600,7 @@
         <p:spPr>
           <a:xfrm>
             <a:off x="720000" y="2160000"/>
-            <a:ext cx="8639280" cy="4384080"/>
+            <a:ext cx="8638920" cy="4383720"/>
           </a:xfrm>
           <a:prstGeom prst="rect">
             <a:avLst/>

</xml_diff>